<commit_message>
Se agregó una diapo
</commit_message>
<xml_diff>
--- a/Diagnóstico.pptx
+++ b/Diagnóstico.pptx
@@ -13,7 +13,8 @@
     <p:sldId id="260" r:id="rId7"/>
     <p:sldId id="261" r:id="rId8"/>
     <p:sldId id="263" r:id="rId9"/>
-    <p:sldId id="264" r:id="rId10"/>
+    <p:sldId id="265" r:id="rId10"/>
+    <p:sldId id="264" r:id="rId11"/>
   </p:sldIdLst>
   <p:sldSz cx="12192000" cy="6858000"/>
   <p:notesSz cx="6858000" cy="9144000"/>
@@ -4709,23 +4710,23 @@
     </dgm:pt>
   </dgm:ptLst>
   <dgm:cxnLst>
+    <dgm:cxn modelId="{86AD07D4-ED59-4ECD-918C-D1490AAFBDD1}" type="presOf" srcId="{62DA7DE8-24DA-42BB-B1F0-ABECADCA5125}" destId="{43337DCB-C0F9-491D-B27B-606D0294738F}" srcOrd="0" destOrd="0" presId="urn:microsoft.com/office/officeart/2005/8/layout/vList5"/>
+    <dgm:cxn modelId="{B01771D9-DCD9-4A4B-A5CB-097F06289AE4}" srcId="{D098B71E-3653-4795-9B3A-0D2567C6C426}" destId="{1162CD43-4F06-4B8E-910A-78314C4C2D2A}" srcOrd="6" destOrd="0" parTransId="{777DDA14-5F1A-4BF4-9D07-8D6BACC0DEE2}" sibTransId="{3E4967E0-4386-4686-9506-84E33A785EFD}"/>
+    <dgm:cxn modelId="{360A97B8-3BCF-46C6-899D-C843C6F4606F}" srcId="{D098B71E-3653-4795-9B3A-0D2567C6C426}" destId="{E9C330A5-18D6-4357-A2B2-623B70AF0B4B}" srcOrd="2" destOrd="0" parTransId="{8FE17881-37FA-4E87-B6D0-7D64D79411EC}" sibTransId="{14C46581-3630-4898-BB36-9E2DD9354BA4}"/>
+    <dgm:cxn modelId="{B48CAD56-1551-4767-A588-3D65DC614E0C}" srcId="{D098B71E-3653-4795-9B3A-0D2567C6C426}" destId="{76C804FE-4A0F-4404-A465-422B8C281DDB}" srcOrd="1" destOrd="0" parTransId="{C48B9749-7B32-41DF-89DC-7DDD2A701629}" sibTransId="{21FBF169-1A18-4E2D-8765-035EDFD6F8D8}"/>
+    <dgm:cxn modelId="{C9A301DA-BE40-49BF-96D9-5EAC16BEB17E}" type="presOf" srcId="{1DC5F969-2AE9-424A-866E-A31E1BFBC4FE}" destId="{9F231058-0568-4DD8-890B-A0E35E7FBD2D}" srcOrd="0" destOrd="0" presId="urn:microsoft.com/office/officeart/2005/8/layout/vList5"/>
+    <dgm:cxn modelId="{2A7015ED-5ED4-43A6-92E7-D8DE4BB27664}" srcId="{D098B71E-3653-4795-9B3A-0D2567C6C426}" destId="{1DC5F969-2AE9-424A-866E-A31E1BFBC4FE}" srcOrd="7" destOrd="0" parTransId="{4080392D-480C-40D8-ACCD-81AE8FDD0ADA}" sibTransId="{80E59199-9516-4556-ABD7-9D1EEE6D8F06}"/>
     <dgm:cxn modelId="{2A7610F0-9485-42D2-B9A7-18270F049269}" type="presOf" srcId="{E9C330A5-18D6-4357-A2B2-623B70AF0B4B}" destId="{2B243AC1-219E-43B7-B15A-5F7EA76F81A3}" srcOrd="0" destOrd="0" presId="urn:microsoft.com/office/officeart/2005/8/layout/vList5"/>
+    <dgm:cxn modelId="{9A9E728B-E19F-46B8-93B6-E4F61E7478B1}" srcId="{D098B71E-3653-4795-9B3A-0D2567C6C426}" destId="{70CE5CD0-002C-4AF2-87FD-CAB0223B6792}" srcOrd="4" destOrd="0" parTransId="{25A1D576-209F-49BB-A7C0-3DCF70680812}" sibTransId="{2272A908-9ACE-4825-8B5D-7E0E9C7FCA0D}"/>
+    <dgm:cxn modelId="{4074231A-0C93-4357-AFDE-D36896094E90}" type="presOf" srcId="{70CE5CD0-002C-4AF2-87FD-CAB0223B6792}" destId="{9A4300E0-761B-4DD1-B6B3-0F2AC9894200}" srcOrd="0" destOrd="0" presId="urn:microsoft.com/office/officeart/2005/8/layout/vList5"/>
     <dgm:cxn modelId="{B6A3EDA1-9592-471F-8E40-C337491465AC}" type="presOf" srcId="{D098B71E-3653-4795-9B3A-0D2567C6C426}" destId="{CB8F2D16-3590-45A7-9AB4-3000C564B2AD}" srcOrd="0" destOrd="0" presId="urn:microsoft.com/office/officeart/2005/8/layout/vList5"/>
-    <dgm:cxn modelId="{2A7015ED-5ED4-43A6-92E7-D8DE4BB27664}" srcId="{D098B71E-3653-4795-9B3A-0D2567C6C426}" destId="{1DC5F969-2AE9-424A-866E-A31E1BFBC4FE}" srcOrd="7" destOrd="0" parTransId="{4080392D-480C-40D8-ACCD-81AE8FDD0ADA}" sibTransId="{80E59199-9516-4556-ABD7-9D1EEE6D8F06}"/>
-    <dgm:cxn modelId="{360A97B8-3BCF-46C6-899D-C843C6F4606F}" srcId="{D098B71E-3653-4795-9B3A-0D2567C6C426}" destId="{E9C330A5-18D6-4357-A2B2-623B70AF0B4B}" srcOrd="2" destOrd="0" parTransId="{8FE17881-37FA-4E87-B6D0-7D64D79411EC}" sibTransId="{14C46581-3630-4898-BB36-9E2DD9354BA4}"/>
-    <dgm:cxn modelId="{B01771D9-DCD9-4A4B-A5CB-097F06289AE4}" srcId="{D098B71E-3653-4795-9B3A-0D2567C6C426}" destId="{1162CD43-4F06-4B8E-910A-78314C4C2D2A}" srcOrd="6" destOrd="0" parTransId="{777DDA14-5F1A-4BF4-9D07-8D6BACC0DEE2}" sibTransId="{3E4967E0-4386-4686-9506-84E33A785EFD}"/>
+    <dgm:cxn modelId="{F807A21F-B3E9-46AA-A118-2732B3825071}" srcId="{D098B71E-3653-4795-9B3A-0D2567C6C426}" destId="{62DA7DE8-24DA-42BB-B1F0-ABECADCA5125}" srcOrd="3" destOrd="0" parTransId="{6D640F81-1928-4D6C-8DAD-2BD2AF61844F}" sibTransId="{D20463CF-09C6-4297-BC62-FBF287CBEA67}"/>
+    <dgm:cxn modelId="{E1980F24-63D2-42BF-8298-92F6C44DD158}" type="presOf" srcId="{76C804FE-4A0F-4404-A465-422B8C281DDB}" destId="{B8F2B58E-1F60-41AC-9FA1-BD6F2B7F8EAA}" srcOrd="0" destOrd="0" presId="urn:microsoft.com/office/officeart/2005/8/layout/vList5"/>
+    <dgm:cxn modelId="{0E84389E-98C6-46E1-8577-36E360EB18F2}" type="presOf" srcId="{F0836DB6-6006-45CA-99C6-7D415168C419}" destId="{07180E7A-7FC8-45BA-B27E-73B9FAE17995}" srcOrd="0" destOrd="0" presId="urn:microsoft.com/office/officeart/2005/8/layout/vList5"/>
+    <dgm:cxn modelId="{D48C3ABE-911C-46C4-89FA-9C6CEFCCEDAA}" type="presOf" srcId="{1162CD43-4F06-4B8E-910A-78314C4C2D2A}" destId="{2C7086C4-5C33-441D-BAB5-E9342B105050}" srcOrd="0" destOrd="0" presId="urn:microsoft.com/office/officeart/2005/8/layout/vList5"/>
+    <dgm:cxn modelId="{066A891A-27E8-4B5D-9E24-BA0D678D8C8D}" srcId="{D098B71E-3653-4795-9B3A-0D2567C6C426}" destId="{73D1E23B-D164-43DB-9F27-FE306C9EAF95}" srcOrd="5" destOrd="0" parTransId="{C97B4526-629F-4183-8E8E-D3752DC6B750}" sibTransId="{766C8456-DFA4-4218-82D4-6CA481BABC0F}"/>
     <dgm:cxn modelId="{AABA3A62-D8E6-46D2-BA34-170D120E5BBB}" type="presOf" srcId="{73D1E23B-D164-43DB-9F27-FE306C9EAF95}" destId="{FDBCF105-1A0D-4062-8FBE-473033920835}" srcOrd="0" destOrd="0" presId="urn:microsoft.com/office/officeart/2005/8/layout/vList5"/>
-    <dgm:cxn modelId="{D48C3ABE-911C-46C4-89FA-9C6CEFCCEDAA}" type="presOf" srcId="{1162CD43-4F06-4B8E-910A-78314C4C2D2A}" destId="{2C7086C4-5C33-441D-BAB5-E9342B105050}" srcOrd="0" destOrd="0" presId="urn:microsoft.com/office/officeart/2005/8/layout/vList5"/>
-    <dgm:cxn modelId="{E1980F24-63D2-42BF-8298-92F6C44DD158}" type="presOf" srcId="{76C804FE-4A0F-4404-A465-422B8C281DDB}" destId="{B8F2B58E-1F60-41AC-9FA1-BD6F2B7F8EAA}" srcOrd="0" destOrd="0" presId="urn:microsoft.com/office/officeart/2005/8/layout/vList5"/>
-    <dgm:cxn modelId="{B48CAD56-1551-4767-A588-3D65DC614E0C}" srcId="{D098B71E-3653-4795-9B3A-0D2567C6C426}" destId="{76C804FE-4A0F-4404-A465-422B8C281DDB}" srcOrd="1" destOrd="0" parTransId="{C48B9749-7B32-41DF-89DC-7DDD2A701629}" sibTransId="{21FBF169-1A18-4E2D-8765-035EDFD6F8D8}"/>
     <dgm:cxn modelId="{B0BF58CC-79C5-4DA0-BFFF-7260BA938A6C}" srcId="{D098B71E-3653-4795-9B3A-0D2567C6C426}" destId="{F0836DB6-6006-45CA-99C6-7D415168C419}" srcOrd="0" destOrd="0" parTransId="{089911F4-98AE-4649-AAE1-26D2FDF9662E}" sibTransId="{3DC065CB-1029-4EE1-95B6-C90EC957618B}"/>
-    <dgm:cxn modelId="{F807A21F-B3E9-46AA-A118-2732B3825071}" srcId="{D098B71E-3653-4795-9B3A-0D2567C6C426}" destId="{62DA7DE8-24DA-42BB-B1F0-ABECADCA5125}" srcOrd="3" destOrd="0" parTransId="{6D640F81-1928-4D6C-8DAD-2BD2AF61844F}" sibTransId="{D20463CF-09C6-4297-BC62-FBF287CBEA67}"/>
-    <dgm:cxn modelId="{0E84389E-98C6-46E1-8577-36E360EB18F2}" type="presOf" srcId="{F0836DB6-6006-45CA-99C6-7D415168C419}" destId="{07180E7A-7FC8-45BA-B27E-73B9FAE17995}" srcOrd="0" destOrd="0" presId="urn:microsoft.com/office/officeart/2005/8/layout/vList5"/>
-    <dgm:cxn modelId="{86AD07D4-ED59-4ECD-918C-D1490AAFBDD1}" type="presOf" srcId="{62DA7DE8-24DA-42BB-B1F0-ABECADCA5125}" destId="{43337DCB-C0F9-491D-B27B-606D0294738F}" srcOrd="0" destOrd="0" presId="urn:microsoft.com/office/officeart/2005/8/layout/vList5"/>
-    <dgm:cxn modelId="{C9A301DA-BE40-49BF-96D9-5EAC16BEB17E}" type="presOf" srcId="{1DC5F969-2AE9-424A-866E-A31E1BFBC4FE}" destId="{9F231058-0568-4DD8-890B-A0E35E7FBD2D}" srcOrd="0" destOrd="0" presId="urn:microsoft.com/office/officeart/2005/8/layout/vList5"/>
-    <dgm:cxn modelId="{4074231A-0C93-4357-AFDE-D36896094E90}" type="presOf" srcId="{70CE5CD0-002C-4AF2-87FD-CAB0223B6792}" destId="{9A4300E0-761B-4DD1-B6B3-0F2AC9894200}" srcOrd="0" destOrd="0" presId="urn:microsoft.com/office/officeart/2005/8/layout/vList5"/>
-    <dgm:cxn modelId="{9A9E728B-E19F-46B8-93B6-E4F61E7478B1}" srcId="{D098B71E-3653-4795-9B3A-0D2567C6C426}" destId="{70CE5CD0-002C-4AF2-87FD-CAB0223B6792}" srcOrd="4" destOrd="0" parTransId="{25A1D576-209F-49BB-A7C0-3DCF70680812}" sibTransId="{2272A908-9ACE-4825-8B5D-7E0E9C7FCA0D}"/>
-    <dgm:cxn modelId="{066A891A-27E8-4B5D-9E24-BA0D678D8C8D}" srcId="{D098B71E-3653-4795-9B3A-0D2567C6C426}" destId="{73D1E23B-D164-43DB-9F27-FE306C9EAF95}" srcOrd="5" destOrd="0" parTransId="{C97B4526-629F-4183-8E8E-D3752DC6B750}" sibTransId="{766C8456-DFA4-4218-82D4-6CA481BABC0F}"/>
     <dgm:cxn modelId="{887CA040-AF84-43B9-9077-0C5C9EE42C95}" type="presParOf" srcId="{CB8F2D16-3590-45A7-9AB4-3000C564B2AD}" destId="{904CD53F-3FC9-4DA0-B2AB-99DB4ED9F0E9}" srcOrd="0" destOrd="0" presId="urn:microsoft.com/office/officeart/2005/8/layout/vList5"/>
     <dgm:cxn modelId="{618332ED-87D4-4C50-9125-696D4A17ACD2}" type="presParOf" srcId="{904CD53F-3FC9-4DA0-B2AB-99DB4ED9F0E9}" destId="{07180E7A-7FC8-45BA-B27E-73B9FAE17995}" srcOrd="0" destOrd="0" presId="urn:microsoft.com/office/officeart/2005/8/layout/vList5"/>
     <dgm:cxn modelId="{090B414A-CB91-48CF-8FA1-A479FD2E63F9}" type="presParOf" srcId="{CB8F2D16-3590-45A7-9AB4-3000C564B2AD}" destId="{5438EBAF-6485-498A-86F1-3F01FADF5E2B}" srcOrd="1" destOrd="0" presId="urn:microsoft.com/office/officeart/2005/8/layout/vList5"/>
@@ -5418,6 +5419,13 @@
         </dgm:presLayoutVars>
       </dgm:prSet>
       <dgm:spPr/>
+      <dgm:t>
+        <a:bodyPr/>
+        <a:lstStyle/>
+        <a:p>
+          <a:endParaRPr lang="es-PE"/>
+        </a:p>
+      </dgm:t>
     </dgm:pt>
     <dgm:pt modelId="{F45D8F5F-0314-408C-AEE9-8F42BF269C5F}" type="pres">
       <dgm:prSet presAssocID="{346CB0BA-B2CA-420D-AEC9-02688253FF7D}" presName="spVertical2" presStyleCnt="0"/>
@@ -5448,6 +5456,13 @@
         </dgm:presLayoutVars>
       </dgm:prSet>
       <dgm:spPr/>
+      <dgm:t>
+        <a:bodyPr/>
+        <a:lstStyle/>
+        <a:p>
+          <a:endParaRPr lang="es-PE"/>
+        </a:p>
+      </dgm:t>
     </dgm:pt>
     <dgm:pt modelId="{453AE724-F5C2-4CAF-BEF8-E1173712C218}" type="pres">
       <dgm:prSet presAssocID="{CE7220C3-79E3-4B57-B123-8E0C072A3FED}" presName="spVertical2" presStyleCnt="0"/>
@@ -5478,6 +5493,13 @@
         </dgm:presLayoutVars>
       </dgm:prSet>
       <dgm:spPr/>
+      <dgm:t>
+        <a:bodyPr/>
+        <a:lstStyle/>
+        <a:p>
+          <a:endParaRPr lang="es-PE"/>
+        </a:p>
+      </dgm:t>
     </dgm:pt>
     <dgm:pt modelId="{7D2594F2-3C85-4D28-9901-3256B500EF1D}" type="pres">
       <dgm:prSet presAssocID="{D2DAD2EE-D347-4088-BF63-3CC01251FF93}" presName="spVertical2" presStyleCnt="0"/>
@@ -6634,439 +6656,6 @@
       <dsp:cNvGrpSpPr/>
     </dsp:nvGrpSpPr>
     <dsp:grpSpPr/>
-    <dsp:sp modelId="{07A08954-41A6-4729-8E62-699D1FEF63A2}">
-      <dsp:nvSpPr>
-        <dsp:cNvPr id="0" name=""/>
-        <dsp:cNvSpPr/>
-      </dsp:nvSpPr>
-      <dsp:spPr>
-        <a:xfrm>
-          <a:off x="2789406" y="246458"/>
-          <a:ext cx="3251941" cy="1256688"/>
-        </a:xfrm>
-        <a:prstGeom prst="ellipse">
-          <a:avLst/>
-        </a:prstGeom>
-        <a:solidFill>
-          <a:schemeClr val="accent1">
-            <a:tint val="50000"/>
-            <a:alpha val="40000"/>
-            <a:hueOff val="0"/>
-            <a:satOff val="0"/>
-            <a:lumOff val="0"/>
-            <a:alphaOff val="0"/>
-          </a:schemeClr>
-        </a:solidFill>
-        <a:ln>
-          <a:noFill/>
-        </a:ln>
-        <a:effectLst/>
-      </dsp:spPr>
-      <dsp:style>
-        <a:lnRef idx="0">
-          <a:scrgbClr r="0" g="0" b="0"/>
-        </a:lnRef>
-        <a:fillRef idx="1">
-          <a:scrgbClr r="0" g="0" b="0"/>
-        </a:fillRef>
-        <a:effectRef idx="0">
-          <a:scrgbClr r="0" g="0" b="0"/>
-        </a:effectRef>
-        <a:fontRef idx="minor"/>
-      </dsp:style>
-    </dsp:sp>
-    <dsp:sp modelId="{46389F78-CC09-431A-A2C6-685AB00A8698}">
-      <dsp:nvSpPr>
-        <dsp:cNvPr id="0" name=""/>
-        <dsp:cNvSpPr/>
-      </dsp:nvSpPr>
-      <dsp:spPr>
-        <a:xfrm>
-          <a:off x="4035180" y="2516054"/>
-          <a:ext cx="819938" cy="524760"/>
-        </a:xfrm>
-        <a:prstGeom prst="downArrow">
-          <a:avLst/>
-        </a:prstGeom>
-        <a:solidFill>
-          <a:schemeClr val="accent1">
-            <a:tint val="60000"/>
-            <a:hueOff val="0"/>
-            <a:satOff val="0"/>
-            <a:lumOff val="0"/>
-            <a:alphaOff val="0"/>
-          </a:schemeClr>
-        </a:solidFill>
-        <a:ln w="12700" cap="flat" cmpd="sng" algn="ctr">
-          <a:solidFill>
-            <a:schemeClr val="lt1">
-              <a:hueOff val="0"/>
-              <a:satOff val="0"/>
-              <a:lumOff val="0"/>
-              <a:alphaOff val="0"/>
-            </a:schemeClr>
-          </a:solidFill>
-          <a:prstDash val="solid"/>
-          <a:miter lim="800000"/>
-        </a:ln>
-        <a:effectLst/>
-      </dsp:spPr>
-      <dsp:style>
-        <a:lnRef idx="2">
-          <a:scrgbClr r="0" g="0" b="0"/>
-        </a:lnRef>
-        <a:fillRef idx="1">
-          <a:scrgbClr r="0" g="0" b="0"/>
-        </a:fillRef>
-        <a:effectRef idx="0">
-          <a:scrgbClr r="0" g="0" b="0"/>
-        </a:effectRef>
-        <a:fontRef idx="minor"/>
-      </dsp:style>
-    </dsp:sp>
-    <dsp:sp modelId="{BFD6531A-FF4B-4C8D-BF80-F483609D6AA5}">
-      <dsp:nvSpPr>
-        <dsp:cNvPr id="0" name=""/>
-        <dsp:cNvSpPr/>
-      </dsp:nvSpPr>
-      <dsp:spPr>
-        <a:xfrm>
-          <a:off x="2412051" y="2799648"/>
-          <a:ext cx="3935705" cy="983926"/>
-        </a:xfrm>
-        <a:prstGeom prst="rect">
-          <a:avLst/>
-        </a:prstGeom>
-        <a:noFill/>
-        <a:ln>
-          <a:noFill/>
-        </a:ln>
-        <a:effectLst/>
-      </dsp:spPr>
-      <dsp:style>
-        <a:lnRef idx="0">
-          <a:scrgbClr r="0" g="0" b="0"/>
-        </a:lnRef>
-        <a:fillRef idx="0">
-          <a:scrgbClr r="0" g="0" b="0"/>
-        </a:fillRef>
-        <a:effectRef idx="0">
-          <a:scrgbClr r="0" g="0" b="0"/>
-        </a:effectRef>
-        <a:fontRef idx="minor"/>
-      </dsp:style>
-      <dsp:txBody>
-        <a:bodyPr spcFirstLastPara="0" vert="horz" wrap="square" lIns="163576" tIns="163576" rIns="163576" bIns="163576" numCol="1" spcCol="1270" anchor="ctr" anchorCtr="0">
-          <a:noAutofit/>
-        </a:bodyPr>
-        <a:lstStyle/>
-        <a:p>
-          <a:pPr lvl="0" algn="ctr" defTabSz="1022350">
-            <a:lnSpc>
-              <a:spcPct val="90000"/>
-            </a:lnSpc>
-            <a:spcBef>
-              <a:spcPct val="0"/>
-            </a:spcBef>
-            <a:spcAft>
-              <a:spcPct val="35000"/>
-            </a:spcAft>
-          </a:pPr>
-          <a:r>
-            <a:rPr lang="es-PE" sz="2300" kern="1200" dirty="0" smtClean="0"/>
-            <a:t>Planificación de Gobierno Digital y Tecnologías Digitales</a:t>
-          </a:r>
-          <a:endParaRPr lang="es-PE" sz="2300" kern="1200" dirty="0"/>
-        </a:p>
-      </dsp:txBody>
-      <dsp:txXfrm>
-        <a:off x="2412051" y="2799648"/>
-        <a:ext cx="3935705" cy="983926"/>
-      </dsp:txXfrm>
-    </dsp:sp>
-    <dsp:sp modelId="{3BCD638E-0D4F-4EA6-A224-48CED59D4771}">
-      <dsp:nvSpPr>
-        <dsp:cNvPr id="0" name=""/>
-        <dsp:cNvSpPr/>
-      </dsp:nvSpPr>
-      <dsp:spPr>
-        <a:xfrm>
-          <a:off x="3804615" y="1427116"/>
-          <a:ext cx="1290030" cy="999546"/>
-        </a:xfrm>
-        <a:prstGeom prst="ellipse">
-          <a:avLst/>
-        </a:prstGeom>
-        <a:solidFill>
-          <a:schemeClr val="accent1">
-            <a:hueOff val="0"/>
-            <a:satOff val="0"/>
-            <a:lumOff val="0"/>
-            <a:alphaOff val="0"/>
-          </a:schemeClr>
-        </a:solidFill>
-        <a:ln w="12700" cap="flat" cmpd="sng" algn="ctr">
-          <a:solidFill>
-            <a:schemeClr val="lt1">
-              <a:hueOff val="0"/>
-              <a:satOff val="0"/>
-              <a:lumOff val="0"/>
-              <a:alphaOff val="0"/>
-            </a:schemeClr>
-          </a:solidFill>
-          <a:prstDash val="solid"/>
-          <a:miter lim="800000"/>
-        </a:ln>
-        <a:effectLst/>
-      </dsp:spPr>
-      <dsp:style>
-        <a:lnRef idx="2">
-          <a:scrgbClr r="0" g="0" b="0"/>
-        </a:lnRef>
-        <a:fillRef idx="1">
-          <a:scrgbClr r="0" g="0" b="0"/>
-        </a:fillRef>
-        <a:effectRef idx="0">
-          <a:scrgbClr r="0" g="0" b="0"/>
-        </a:effectRef>
-        <a:fontRef idx="minor">
-          <a:schemeClr val="lt1"/>
-        </a:fontRef>
-      </dsp:style>
-      <dsp:txBody>
-        <a:bodyPr spcFirstLastPara="0" vert="horz" wrap="square" lIns="15240" tIns="15240" rIns="15240" bIns="15240" numCol="1" spcCol="1270" anchor="ctr" anchorCtr="0">
-          <a:noAutofit/>
-        </a:bodyPr>
-        <a:lstStyle/>
-        <a:p>
-          <a:pPr lvl="0" algn="ctr" defTabSz="533400">
-            <a:lnSpc>
-              <a:spcPct val="90000"/>
-            </a:lnSpc>
-            <a:spcBef>
-              <a:spcPct val="0"/>
-            </a:spcBef>
-            <a:spcAft>
-              <a:spcPct val="35000"/>
-            </a:spcAft>
-          </a:pPr>
-          <a:r>
-            <a:rPr lang="es-PE" sz="1200" kern="1200" dirty="0" smtClean="0"/>
-            <a:t>Plan Operativo Informático</a:t>
-          </a:r>
-          <a:endParaRPr lang="es-PE" sz="1200" kern="1200" dirty="0"/>
-        </a:p>
-      </dsp:txBody>
-      <dsp:txXfrm>
-        <a:off x="3993536" y="1573496"/>
-        <a:ext cx="912188" cy="706786"/>
-      </dsp:txXfrm>
-    </dsp:sp>
-    <dsp:sp modelId="{5A93BAB0-0051-4185-9981-E11E71EBBA72}">
-      <dsp:nvSpPr>
-        <dsp:cNvPr id="0" name=""/>
-        <dsp:cNvSpPr/>
-      </dsp:nvSpPr>
-      <dsp:spPr>
-        <a:xfrm>
-          <a:off x="2945241" y="502542"/>
-          <a:ext cx="1290030" cy="999546"/>
-        </a:xfrm>
-        <a:prstGeom prst="ellipse">
-          <a:avLst/>
-        </a:prstGeom>
-        <a:solidFill>
-          <a:schemeClr val="accent1">
-            <a:hueOff val="0"/>
-            <a:satOff val="0"/>
-            <a:lumOff val="0"/>
-            <a:alphaOff val="0"/>
-          </a:schemeClr>
-        </a:solidFill>
-        <a:ln w="12700" cap="flat" cmpd="sng" algn="ctr">
-          <a:solidFill>
-            <a:schemeClr val="lt1">
-              <a:hueOff val="0"/>
-              <a:satOff val="0"/>
-              <a:lumOff val="0"/>
-              <a:alphaOff val="0"/>
-            </a:schemeClr>
-          </a:solidFill>
-          <a:prstDash val="solid"/>
-          <a:miter lim="800000"/>
-        </a:ln>
-        <a:effectLst/>
-      </dsp:spPr>
-      <dsp:style>
-        <a:lnRef idx="2">
-          <a:scrgbClr r="0" g="0" b="0"/>
-        </a:lnRef>
-        <a:fillRef idx="1">
-          <a:scrgbClr r="0" g="0" b="0"/>
-        </a:fillRef>
-        <a:effectRef idx="0">
-          <a:scrgbClr r="0" g="0" b="0"/>
-        </a:effectRef>
-        <a:fontRef idx="minor">
-          <a:schemeClr val="lt1"/>
-        </a:fontRef>
-      </dsp:style>
-      <dsp:txBody>
-        <a:bodyPr spcFirstLastPara="0" vert="horz" wrap="square" lIns="15240" tIns="15240" rIns="15240" bIns="15240" numCol="1" spcCol="1270" anchor="ctr" anchorCtr="0">
-          <a:noAutofit/>
-        </a:bodyPr>
-        <a:lstStyle/>
-        <a:p>
-          <a:pPr lvl="0" algn="ctr" defTabSz="533400">
-            <a:lnSpc>
-              <a:spcPct val="90000"/>
-            </a:lnSpc>
-            <a:spcBef>
-              <a:spcPct val="0"/>
-            </a:spcBef>
-            <a:spcAft>
-              <a:spcPct val="35000"/>
-            </a:spcAft>
-          </a:pPr>
-          <a:r>
-            <a:rPr lang="es-PE" sz="1200" kern="1200" dirty="0" smtClean="0"/>
-            <a:t>P.E. de Gobierno Electrónico</a:t>
-          </a:r>
-          <a:endParaRPr lang="es-PE" sz="1200" kern="1200" dirty="0"/>
-        </a:p>
-      </dsp:txBody>
-      <dsp:txXfrm>
-        <a:off x="3134162" y="648922"/>
-        <a:ext cx="912188" cy="706786"/>
-      </dsp:txXfrm>
-    </dsp:sp>
-    <dsp:sp modelId="{9FAE5C2B-ED99-4925-AFA8-6B661A4530FE}">
-      <dsp:nvSpPr>
-        <dsp:cNvPr id="0" name=""/>
-        <dsp:cNvSpPr/>
-      </dsp:nvSpPr>
-      <dsp:spPr>
-        <a:xfrm>
-          <a:off x="4383676" y="426729"/>
-          <a:ext cx="1290030" cy="999546"/>
-        </a:xfrm>
-        <a:prstGeom prst="ellipse">
-          <a:avLst/>
-        </a:prstGeom>
-        <a:solidFill>
-          <a:schemeClr val="accent1">
-            <a:hueOff val="0"/>
-            <a:satOff val="0"/>
-            <a:lumOff val="0"/>
-            <a:alphaOff val="0"/>
-          </a:schemeClr>
-        </a:solidFill>
-        <a:ln w="12700" cap="flat" cmpd="sng" algn="ctr">
-          <a:solidFill>
-            <a:schemeClr val="lt1">
-              <a:hueOff val="0"/>
-              <a:satOff val="0"/>
-              <a:lumOff val="0"/>
-              <a:alphaOff val="0"/>
-            </a:schemeClr>
-          </a:solidFill>
-          <a:prstDash val="solid"/>
-          <a:miter lim="800000"/>
-        </a:ln>
-        <a:effectLst/>
-      </dsp:spPr>
-      <dsp:style>
-        <a:lnRef idx="2">
-          <a:scrgbClr r="0" g="0" b="0"/>
-        </a:lnRef>
-        <a:fillRef idx="1">
-          <a:scrgbClr r="0" g="0" b="0"/>
-        </a:fillRef>
-        <a:effectRef idx="0">
-          <a:scrgbClr r="0" g="0" b="0"/>
-        </a:effectRef>
-        <a:fontRef idx="minor">
-          <a:schemeClr val="lt1"/>
-        </a:fontRef>
-      </dsp:style>
-      <dsp:txBody>
-        <a:bodyPr spcFirstLastPara="0" vert="horz" wrap="square" lIns="15240" tIns="15240" rIns="15240" bIns="15240" numCol="1" spcCol="1270" anchor="ctr" anchorCtr="0">
-          <a:noAutofit/>
-        </a:bodyPr>
-        <a:lstStyle/>
-        <a:p>
-          <a:pPr lvl="0" algn="ctr" defTabSz="533400">
-            <a:lnSpc>
-              <a:spcPct val="90000"/>
-            </a:lnSpc>
-            <a:spcBef>
-              <a:spcPct val="0"/>
-            </a:spcBef>
-            <a:spcAft>
-              <a:spcPct val="35000"/>
-            </a:spcAft>
-          </a:pPr>
-          <a:r>
-            <a:rPr lang="es-PE" sz="1200" kern="1200" dirty="0" smtClean="0"/>
-            <a:t>P.E. de Tecnologías de la Información</a:t>
-          </a:r>
-          <a:endParaRPr lang="es-PE" sz="1200" kern="1200" dirty="0"/>
-        </a:p>
-      </dsp:txBody>
-      <dsp:txXfrm>
-        <a:off x="4572597" y="573109"/>
-        <a:ext cx="912188" cy="706786"/>
-      </dsp:txXfrm>
-    </dsp:sp>
-    <dsp:sp modelId="{D4BDEE28-E76C-4FFA-AB1C-20EDAF09580F}">
-      <dsp:nvSpPr>
-        <dsp:cNvPr id="0" name=""/>
-        <dsp:cNvSpPr/>
-      </dsp:nvSpPr>
-      <dsp:spPr>
-        <a:xfrm>
-          <a:off x="2652909" y="294556"/>
-          <a:ext cx="3509953" cy="2019263"/>
-        </a:xfrm>
-        <a:prstGeom prst="funnel">
-          <a:avLst/>
-        </a:prstGeom>
-        <a:solidFill>
-          <a:schemeClr val="lt1">
-            <a:alpha val="40000"/>
-            <a:hueOff val="0"/>
-            <a:satOff val="0"/>
-            <a:lumOff val="0"/>
-            <a:alphaOff val="0"/>
-          </a:schemeClr>
-        </a:solidFill>
-        <a:ln w="6350" cap="flat" cmpd="sng" algn="ctr">
-          <a:solidFill>
-            <a:schemeClr val="accent1">
-              <a:hueOff val="0"/>
-              <a:satOff val="0"/>
-              <a:lumOff val="0"/>
-              <a:alphaOff val="0"/>
-            </a:schemeClr>
-          </a:solidFill>
-          <a:prstDash val="solid"/>
-          <a:miter lim="800000"/>
-        </a:ln>
-        <a:effectLst/>
-      </dsp:spPr>
-      <dsp:style>
-        <a:lnRef idx="1">
-          <a:scrgbClr r="0" g="0" b="0"/>
-        </a:lnRef>
-        <a:fillRef idx="1">
-          <a:scrgbClr r="0" g="0" b="0"/>
-        </a:fillRef>
-        <a:effectRef idx="0">
-          <a:scrgbClr r="0" g="0" b="0"/>
-        </a:effectRef>
-        <a:fontRef idx="minor"/>
-      </dsp:style>
-    </dsp:sp>
   </dsp:spTree>
 </dsp:drawing>
 </file>
@@ -7079,280 +6668,6 @@
       <dsp:cNvGrpSpPr/>
     </dsp:nvGrpSpPr>
     <dsp:grpSpPr/>
-    <dsp:sp modelId="{CD118C71-EB48-443A-9347-C732F2005474}">
-      <dsp:nvSpPr>
-        <dsp:cNvPr id="0" name=""/>
-        <dsp:cNvSpPr/>
-      </dsp:nvSpPr>
-      <dsp:spPr>
-        <a:xfrm>
-          <a:off x="894842" y="0"/>
-          <a:ext cx="6045200" cy="2233990"/>
-        </a:xfrm>
-        <a:prstGeom prst="rightArrow">
-          <a:avLst/>
-        </a:prstGeom>
-        <a:solidFill>
-          <a:schemeClr val="accent1">
-            <a:tint val="40000"/>
-            <a:hueOff val="0"/>
-            <a:satOff val="0"/>
-            <a:lumOff val="0"/>
-            <a:alphaOff val="0"/>
-          </a:schemeClr>
-        </a:solidFill>
-        <a:ln>
-          <a:noFill/>
-        </a:ln>
-        <a:effectLst/>
-      </dsp:spPr>
-      <dsp:style>
-        <a:lnRef idx="0">
-          <a:scrgbClr r="0" g="0" b="0"/>
-        </a:lnRef>
-        <a:fillRef idx="1">
-          <a:scrgbClr r="0" g="0" b="0"/>
-        </a:fillRef>
-        <a:effectRef idx="0">
-          <a:scrgbClr r="0" g="0" b="0"/>
-        </a:effectRef>
-        <a:fontRef idx="minor"/>
-      </dsp:style>
-    </dsp:sp>
-    <dsp:sp modelId="{96EE2B61-07D1-4F79-AC9F-08B6D46CB84F}">
-      <dsp:nvSpPr>
-        <dsp:cNvPr id="0" name=""/>
-        <dsp:cNvSpPr/>
-      </dsp:nvSpPr>
-      <dsp:spPr>
-        <a:xfrm>
-          <a:off x="241002" y="670196"/>
-          <a:ext cx="2133600" cy="893596"/>
-        </a:xfrm>
-        <a:prstGeom prst="roundRect">
-          <a:avLst/>
-        </a:prstGeom>
-        <a:solidFill>
-          <a:schemeClr val="accent1">
-            <a:hueOff val="0"/>
-            <a:satOff val="0"/>
-            <a:lumOff val="0"/>
-            <a:alphaOff val="0"/>
-          </a:schemeClr>
-        </a:solidFill>
-        <a:ln w="12700" cap="flat" cmpd="sng" algn="ctr">
-          <a:solidFill>
-            <a:schemeClr val="lt1">
-              <a:hueOff val="0"/>
-              <a:satOff val="0"/>
-              <a:lumOff val="0"/>
-              <a:alphaOff val="0"/>
-            </a:schemeClr>
-          </a:solidFill>
-          <a:prstDash val="solid"/>
-          <a:miter lim="800000"/>
-        </a:ln>
-        <a:effectLst/>
-      </dsp:spPr>
-      <dsp:style>
-        <a:lnRef idx="2">
-          <a:scrgbClr r="0" g="0" b="0"/>
-        </a:lnRef>
-        <a:fillRef idx="1">
-          <a:scrgbClr r="0" g="0" b="0"/>
-        </a:fillRef>
-        <a:effectRef idx="0">
-          <a:scrgbClr r="0" g="0" b="0"/>
-        </a:effectRef>
-        <a:fontRef idx="minor">
-          <a:schemeClr val="lt1"/>
-        </a:fontRef>
-      </dsp:style>
-      <dsp:txBody>
-        <a:bodyPr spcFirstLastPara="0" vert="horz" wrap="square" lIns="60960" tIns="60960" rIns="60960" bIns="60960" numCol="1" spcCol="1270" anchor="ctr" anchorCtr="0">
-          <a:noAutofit/>
-        </a:bodyPr>
-        <a:lstStyle/>
-        <a:p>
-          <a:pPr lvl="0" algn="ctr" defTabSz="711200">
-            <a:lnSpc>
-              <a:spcPct val="90000"/>
-            </a:lnSpc>
-            <a:spcBef>
-              <a:spcPct val="0"/>
-            </a:spcBef>
-            <a:spcAft>
-              <a:spcPct val="35000"/>
-            </a:spcAft>
-          </a:pPr>
-          <a:r>
-            <a:rPr lang="es-PE" sz="1600" kern="1200" dirty="0" smtClean="0"/>
-            <a:t>Ayuda a Reducir el Marco Regulatorio disperso y redundante</a:t>
-          </a:r>
-          <a:endParaRPr lang="es-PE" sz="1600" kern="1200" dirty="0"/>
-        </a:p>
-      </dsp:txBody>
-      <dsp:txXfrm>
-        <a:off x="284624" y="713818"/>
-        <a:ext cx="2046356" cy="806352"/>
-      </dsp:txXfrm>
-    </dsp:sp>
-    <dsp:sp modelId="{B8BD99D8-7CB2-4A2C-8328-6933C3C56614}">
-      <dsp:nvSpPr>
-        <dsp:cNvPr id="0" name=""/>
-        <dsp:cNvSpPr/>
-      </dsp:nvSpPr>
-      <dsp:spPr>
-        <a:xfrm>
-          <a:off x="2489199" y="670196"/>
-          <a:ext cx="2133600" cy="893596"/>
-        </a:xfrm>
-        <a:prstGeom prst="roundRect">
-          <a:avLst/>
-        </a:prstGeom>
-        <a:solidFill>
-          <a:schemeClr val="accent1">
-            <a:hueOff val="0"/>
-            <a:satOff val="0"/>
-            <a:lumOff val="0"/>
-            <a:alphaOff val="0"/>
-          </a:schemeClr>
-        </a:solidFill>
-        <a:ln w="12700" cap="flat" cmpd="sng" algn="ctr">
-          <a:solidFill>
-            <a:schemeClr val="lt1">
-              <a:hueOff val="0"/>
-              <a:satOff val="0"/>
-              <a:lumOff val="0"/>
-              <a:alphaOff val="0"/>
-            </a:schemeClr>
-          </a:solidFill>
-          <a:prstDash val="solid"/>
-          <a:miter lim="800000"/>
-        </a:ln>
-        <a:effectLst/>
-      </dsp:spPr>
-      <dsp:style>
-        <a:lnRef idx="2">
-          <a:scrgbClr r="0" g="0" b="0"/>
-        </a:lnRef>
-        <a:fillRef idx="1">
-          <a:scrgbClr r="0" g="0" b="0"/>
-        </a:fillRef>
-        <a:effectRef idx="0">
-          <a:scrgbClr r="0" g="0" b="0"/>
-        </a:effectRef>
-        <a:fontRef idx="minor">
-          <a:schemeClr val="lt1"/>
-        </a:fontRef>
-      </dsp:style>
-      <dsp:txBody>
-        <a:bodyPr spcFirstLastPara="0" vert="horz" wrap="square" lIns="60960" tIns="60960" rIns="60960" bIns="60960" numCol="1" spcCol="1270" anchor="ctr" anchorCtr="0">
-          <a:noAutofit/>
-        </a:bodyPr>
-        <a:lstStyle/>
-        <a:p>
-          <a:pPr lvl="0" algn="ctr" defTabSz="711200">
-            <a:lnSpc>
-              <a:spcPct val="90000"/>
-            </a:lnSpc>
-            <a:spcBef>
-              <a:spcPct val="0"/>
-            </a:spcBef>
-            <a:spcAft>
-              <a:spcPct val="35000"/>
-            </a:spcAft>
-          </a:pPr>
-          <a:r>
-            <a:rPr lang="es-PE" sz="1600" kern="1200" dirty="0" smtClean="0"/>
-            <a:t>Adoptar Estándares de Nuevas</a:t>
-          </a:r>
-          <a:endParaRPr lang="es-PE" sz="1600" kern="1200" dirty="0"/>
-        </a:p>
-      </dsp:txBody>
-      <dsp:txXfrm>
-        <a:off x="2532821" y="713818"/>
-        <a:ext cx="2046356" cy="806352"/>
-      </dsp:txXfrm>
-    </dsp:sp>
-    <dsp:sp modelId="{EA391717-954F-434A-B62C-DA9F585433B1}">
-      <dsp:nvSpPr>
-        <dsp:cNvPr id="0" name=""/>
-        <dsp:cNvSpPr/>
-      </dsp:nvSpPr>
-      <dsp:spPr>
-        <a:xfrm>
-          <a:off x="4737397" y="670196"/>
-          <a:ext cx="2133600" cy="893596"/>
-        </a:xfrm>
-        <a:prstGeom prst="roundRect">
-          <a:avLst/>
-        </a:prstGeom>
-        <a:solidFill>
-          <a:schemeClr val="accent1">
-            <a:hueOff val="0"/>
-            <a:satOff val="0"/>
-            <a:lumOff val="0"/>
-            <a:alphaOff val="0"/>
-          </a:schemeClr>
-        </a:solidFill>
-        <a:ln w="12700" cap="flat" cmpd="sng" algn="ctr">
-          <a:solidFill>
-            <a:schemeClr val="lt1">
-              <a:hueOff val="0"/>
-              <a:satOff val="0"/>
-              <a:lumOff val="0"/>
-              <a:alphaOff val="0"/>
-            </a:schemeClr>
-          </a:solidFill>
-          <a:prstDash val="solid"/>
-          <a:miter lim="800000"/>
-        </a:ln>
-        <a:effectLst/>
-      </dsp:spPr>
-      <dsp:style>
-        <a:lnRef idx="2">
-          <a:scrgbClr r="0" g="0" b="0"/>
-        </a:lnRef>
-        <a:fillRef idx="1">
-          <a:scrgbClr r="0" g="0" b="0"/>
-        </a:fillRef>
-        <a:effectRef idx="0">
-          <a:scrgbClr r="0" g="0" b="0"/>
-        </a:effectRef>
-        <a:fontRef idx="minor">
-          <a:schemeClr val="lt1"/>
-        </a:fontRef>
-      </dsp:style>
-      <dsp:txBody>
-        <a:bodyPr spcFirstLastPara="0" vert="horz" wrap="square" lIns="60960" tIns="60960" rIns="60960" bIns="60960" numCol="1" spcCol="1270" anchor="ctr" anchorCtr="0">
-          <a:noAutofit/>
-        </a:bodyPr>
-        <a:lstStyle/>
-        <a:p>
-          <a:pPr lvl="0" algn="ctr" defTabSz="711200">
-            <a:lnSpc>
-              <a:spcPct val="90000"/>
-            </a:lnSpc>
-            <a:spcBef>
-              <a:spcPct val="0"/>
-            </a:spcBef>
-            <a:spcAft>
-              <a:spcPct val="35000"/>
-            </a:spcAft>
-          </a:pPr>
-          <a:r>
-            <a:rPr lang="es-PE" sz="1600" kern="1200" dirty="0" smtClean="0"/>
-            <a:t>Asegura Eficacia y Eficiencia en Administración Pública</a:t>
-          </a:r>
-          <a:endParaRPr lang="es-PE" sz="1600" kern="1200" dirty="0"/>
-        </a:p>
-      </dsp:txBody>
-      <dsp:txXfrm>
-        <a:off x="4781019" y="713818"/>
-        <a:ext cx="2046356" cy="806352"/>
-      </dsp:txXfrm>
-    </dsp:sp>
   </dsp:spTree>
 </dsp:drawing>
 </file>
@@ -18001,6 +17316,80 @@
       <p:bldP spid="9" grpId="0" build="p"/>
     </p:bldLst>
   </p:timing>
+</p:sld>
+</file>
+
+<file path=ppt/slides/slide10.xml><?xml version="1.0" encoding="utf-8"?>
+<p:sld xmlns:a="http://schemas.openxmlformats.org/drawingml/2006/main" xmlns:r="http://schemas.openxmlformats.org/officeDocument/2006/relationships" xmlns:p="http://schemas.openxmlformats.org/presentationml/2006/main">
+  <p:cSld>
+    <p:spTree>
+      <p:nvGrpSpPr>
+        <p:cNvPr id="1" name=""/>
+        <p:cNvGrpSpPr/>
+        <p:nvPr/>
+      </p:nvGrpSpPr>
+      <p:grpSpPr>
+        <a:xfrm>
+          <a:off x="0" y="0"/>
+          <a:ext cx="0" cy="0"/>
+          <a:chOff x="0" y="0"/>
+          <a:chExt cx="0" cy="0"/>
+        </a:xfrm>
+      </p:grpSpPr>
+      <p:sp>
+        <p:nvSpPr>
+          <p:cNvPr id="2" name="Título 1"/>
+          <p:cNvSpPr>
+            <a:spLocks noGrp="1"/>
+          </p:cNvSpPr>
+          <p:nvPr>
+            <p:ph type="title"/>
+          </p:nvPr>
+        </p:nvSpPr>
+        <p:spPr/>
+        <p:txBody>
+          <a:bodyPr/>
+          <a:lstStyle/>
+          <a:p>
+            <a:endParaRPr lang="es-PE" dirty="0"/>
+          </a:p>
+        </p:txBody>
+      </p:sp>
+      <p:graphicFrame>
+        <p:nvGraphicFramePr>
+          <p:cNvPr id="4" name="Marcador de contenido 3"/>
+          <p:cNvGraphicFramePr>
+            <a:graphicFrameLocks noGrp="1"/>
+          </p:cNvGraphicFramePr>
+          <p:nvPr>
+            <p:ph idx="1"/>
+            <p:extLst>
+              <p:ext uri="{D42A27DB-BD31-4B8C-83A1-F6EECF244321}">
+                <p14:modId xmlns:p14="http://schemas.microsoft.com/office/powerpoint/2010/main" val="3944346690"/>
+              </p:ext>
+            </p:extLst>
+          </p:nvPr>
+        </p:nvGraphicFramePr>
+        <p:xfrm>
+          <a:off x="838200" y="1825625"/>
+          <a:ext cx="10515600" cy="4351338"/>
+        </p:xfrm>
+        <a:graphic>
+          <a:graphicData uri="http://schemas.openxmlformats.org/drawingml/2006/diagram">
+            <dgm:relIds xmlns:dgm="http://schemas.openxmlformats.org/drawingml/2006/diagram" xmlns:r="http://schemas.openxmlformats.org/officeDocument/2006/relationships" r:dm="rId2" r:lo="rId3" r:qs="rId4" r:cs="rId5"/>
+          </a:graphicData>
+        </a:graphic>
+      </p:graphicFrame>
+    </p:spTree>
+    <p:extLst>
+      <p:ext uri="{BB962C8B-B14F-4D97-AF65-F5344CB8AC3E}">
+        <p14:creationId xmlns:p14="http://schemas.microsoft.com/office/powerpoint/2010/main" val="3900647046"/>
+      </p:ext>
+    </p:extLst>
+  </p:cSld>
+  <p:clrMapOvr>
+    <a:masterClrMapping/>
+  </p:clrMapOvr>
 </p:sld>
 </file>
 
@@ -24413,39 +23802,67 @@
           <a:bodyPr/>
           <a:lstStyle/>
           <a:p>
+            <a:endParaRPr lang="es-PE"/>
+          </a:p>
+        </p:txBody>
+      </p:sp>
+      <p:sp>
+        <p:nvSpPr>
+          <p:cNvPr id="3" name="Marcador de contenido 2"/>
+          <p:cNvSpPr>
+            <a:spLocks noGrp="1"/>
+          </p:cNvSpPr>
+          <p:nvPr>
+            <p:ph idx="1"/>
+          </p:nvPr>
+        </p:nvSpPr>
+        <p:spPr/>
+        <p:txBody>
+          <a:bodyPr/>
+          <a:lstStyle/>
+          <a:p>
+            <a:r>
+              <a:rPr lang="es-PE" dirty="0" smtClean="0"/>
+              <a:t>Esto es todo hasta el momento</a:t>
+            </a:r>
             <a:endParaRPr lang="es-PE" dirty="0"/>
           </a:p>
         </p:txBody>
       </p:sp>
-      <p:graphicFrame>
-        <p:nvGraphicFramePr>
-          <p:cNvPr id="4" name="Marcador de contenido 3"/>
-          <p:cNvGraphicFramePr>
-            <a:graphicFrameLocks noGrp="1"/>
-          </p:cNvGraphicFramePr>
-          <p:nvPr>
-            <p:ph idx="1"/>
-            <p:extLst>
-              <p:ext uri="{D42A27DB-BD31-4B8C-83A1-F6EECF244321}">
-                <p14:modId xmlns:p14="http://schemas.microsoft.com/office/powerpoint/2010/main" val="3944346690"/>
-              </p:ext>
-            </p:extLst>
-          </p:nvPr>
-        </p:nvGraphicFramePr>
-        <p:xfrm>
-          <a:off x="838200" y="1825625"/>
-          <a:ext cx="10515600" cy="4351338"/>
-        </p:xfrm>
-        <a:graphic>
-          <a:graphicData uri="http://schemas.openxmlformats.org/drawingml/2006/diagram">
-            <dgm:relIds xmlns:dgm="http://schemas.openxmlformats.org/drawingml/2006/diagram" xmlns:r="http://schemas.openxmlformats.org/officeDocument/2006/relationships" r:dm="rId2" r:lo="rId3" r:qs="rId4" r:cs="rId5"/>
-          </a:graphicData>
-        </a:graphic>
-      </p:graphicFrame>
+      <p:pic>
+        <p:nvPicPr>
+          <p:cNvPr id="4" name="Imagen 3"/>
+          <p:cNvPicPr>
+            <a:picLocks noChangeAspect="1"/>
+          </p:cNvPicPr>
+          <p:nvPr/>
+        </p:nvPicPr>
+        <p:blipFill>
+          <a:blip r:embed="rId2">
+            <a:extLst>
+              <a:ext uri="{28A0092B-C50C-407E-A947-70E740481C1C}">
+                <a14:useLocalDpi xmlns:a14="http://schemas.microsoft.com/office/drawing/2010/main" val="0"/>
+              </a:ext>
+            </a:extLst>
+          </a:blip>
+          <a:stretch>
+            <a:fillRect/>
+          </a:stretch>
+        </p:blipFill>
+        <p:spPr>
+          <a:xfrm>
+            <a:off x="2754923" y="2247899"/>
+            <a:ext cx="5990492" cy="4492869"/>
+          </a:xfrm>
+          <a:prstGeom prst="rect">
+            <a:avLst/>
+          </a:prstGeom>
+        </p:spPr>
+      </p:pic>
     </p:spTree>
     <p:extLst>
       <p:ext uri="{BB962C8B-B14F-4D97-AF65-F5344CB8AC3E}">
-        <p14:creationId xmlns:p14="http://schemas.microsoft.com/office/powerpoint/2010/main" val="3900647046"/>
+        <p14:creationId xmlns:p14="http://schemas.microsoft.com/office/powerpoint/2010/main" val="3070331546"/>
       </p:ext>
     </p:extLst>
   </p:cSld>

</xml_diff>